<commit_message>
modify international conflict json and pptx
</commit_message>
<xml_diff>
--- a/hrf/international_conflict.pptx
+++ b/hrf/international_conflict.pptx
@@ -5912,7 +5912,7 @@
         <p:spPr>
           <a:xfrm>
             <a:off x="311700" y="1152475"/>
-            <a:ext cx="8520600" cy="3416400"/>
+            <a:ext cx="1678200" cy="3416400"/>
           </a:xfrm>
           <a:prstGeom prst="rect">
             <a:avLst/>
@@ -5934,7 +5934,8 @@
               <a:buNone/>
             </a:pPr>
             <a:r>
-              <a:t/>
+              <a:rPr lang="en"/>
+              <a:t>International Conflict (10277)</a:t>
             </a:r>
             <a:endParaRPr/>
           </a:p>
@@ -6055,7 +6056,7 @@
             </a:pPr>
             <a:r>
               <a:rPr lang="en"/>
-              <a:t>Battle Episode</a:t>
+              <a:t>Battle Episode (10286)</a:t>
             </a:r>
             <a:endParaRPr/>
           </a:p>
@@ -6096,7 +6097,7 @@
             </a:pPr>
             <a:r>
               <a:rPr b="1" lang="en" sz="1200"/>
-              <a:t>Attack</a:t>
+              <a:t>Attack (10278)</a:t>
             </a:r>
             <a:r>
               <a:rPr lang="en" sz="1200"/>
@@ -6117,7 +6118,7 @@
             </a:pPr>
             <a:r>
               <a:rPr b="1" lang="en" sz="1200"/>
-              <a:t>Scarcity</a:t>
+              <a:t>Scarcity (10282)</a:t>
             </a:r>
             <a:r>
               <a:rPr lang="en" sz="1200"/>
@@ -6138,7 +6139,7 @@
             </a:pPr>
             <a:r>
               <a:rPr b="1" lang="en" sz="1200"/>
-              <a:t>Injury</a:t>
+              <a:t>Injury (10280)</a:t>
             </a:r>
             <a:r>
               <a:rPr lang="en" sz="1200"/>
@@ -6159,7 +6160,7 @@
             </a:pPr>
             <a:r>
               <a:rPr b="1" lang="en" sz="1200"/>
-              <a:t>Death</a:t>
+              <a:t>Death (10279)</a:t>
             </a:r>
             <a:r>
               <a:rPr lang="en" sz="1200"/>
@@ -6180,7 +6181,7 @@
             </a:pPr>
             <a:r>
               <a:rPr b="1" lang="en" sz="1200"/>
-              <a:t>Damage</a:t>
+              <a:t>Damage (10281)</a:t>
             </a:r>
             <a:r>
               <a:rPr lang="en" sz="1200"/>
@@ -6209,7 +6210,7 @@
             </a:pPr>
             <a:r>
               <a:rPr b="1" lang="en" sz="1200"/>
-              <a:t>Transport</a:t>
+              <a:t>Transport (10283)</a:t>
             </a:r>
             <a:r>
               <a:rPr lang="en" sz="1200"/>
@@ -6230,7 +6231,7 @@
             </a:pPr>
             <a:r>
               <a:rPr b="1" lang="en" sz="1200"/>
-              <a:t>Demonstration</a:t>
+              <a:t>Demonstration (10284)</a:t>
             </a:r>
             <a:r>
               <a:rPr lang="en" sz="1200"/>
@@ -6251,7 +6252,7 @@
             </a:pPr>
             <a:r>
               <a:rPr b="1" lang="en" sz="1200"/>
-              <a:t>Arrest</a:t>
+              <a:t>Arrest (10285)</a:t>
             </a:r>
             <a:r>
               <a:rPr lang="en" sz="1200"/>
@@ -6348,7 +6349,7 @@
             </a:pPr>
             <a:r>
               <a:rPr lang="en"/>
-              <a:t>Ceasefire Episode</a:t>
+              <a:t>Ceasefire Episode (10292)</a:t>
             </a:r>
             <a:endParaRPr/>
           </a:p>
@@ -6373,7 +6374,7 @@
         </p:spPr>
         <p:txBody>
           <a:bodyPr anchorCtr="0" anchor="t" bIns="91425" lIns="91425" spcFirstLastPara="1" rIns="91425" wrap="square" tIns="91425">
-            <a:normAutofit lnSpcReduction="10000"/>
+            <a:normAutofit fontScale="92500" lnSpcReduction="10000"/>
           </a:bodyPr>
           <a:lstStyle/>
           <a:p>
@@ -6388,7 +6389,7 @@
             </a:pPr>
             <a:r>
               <a:rPr b="1" lang="en" sz="1200"/>
-              <a:t>Remote Communication</a:t>
+              <a:t>Remote Communication (10287)</a:t>
             </a:r>
             <a:r>
               <a:rPr lang="en" sz="1200"/>
@@ -6408,7 +6409,7 @@
             </a:pPr>
             <a:r>
               <a:rPr b="1" lang="en" sz="1200"/>
-              <a:t>Negotiation</a:t>
+              <a:t>Negotiation (10288)</a:t>
             </a:r>
             <a:r>
               <a:rPr lang="en" sz="1200"/>
@@ -6428,7 +6429,7 @@
             </a:pPr>
             <a:r>
               <a:rPr b="1" lang="en" sz="1200"/>
-              <a:t>Negotiation Result</a:t>
+              <a:t>Negotiation Result (10289)</a:t>
             </a:r>
             <a:r>
               <a:rPr lang="en" sz="1200"/>
@@ -6448,7 +6449,7 @@
             </a:pPr>
             <a:r>
               <a:rPr b="1" lang="en" sz="1200"/>
-              <a:t>Rejection</a:t>
+              <a:t>Rejection (10290)</a:t>
             </a:r>
             <a:r>
               <a:rPr lang="en" sz="1200"/>
@@ -6472,7 +6473,7 @@
             </a:pPr>
             <a:r>
               <a:rPr b="1" lang="en" sz="1200"/>
-              <a:t>Agreement</a:t>
+              <a:t>Agreement (10291)</a:t>
             </a:r>
             <a:r>
               <a:rPr lang="en" sz="1200"/>
@@ -6492,7 +6493,7 @@
             </a:pPr>
             <a:r>
               <a:rPr b="1" lang="en" sz="1200"/>
-              <a:t>Announcement</a:t>
+              <a:t>Announcement (10293)</a:t>
             </a:r>
             <a:r>
               <a:rPr lang="en" sz="1200"/>
@@ -6512,7 +6513,7 @@
             </a:pPr>
             <a:r>
               <a:rPr b="1" lang="en" sz="1200"/>
-              <a:t>Withdrawal</a:t>
+              <a:t>Withdrawal (10294)</a:t>
             </a:r>
             <a:r>
               <a:rPr lang="en" sz="1200"/>

</xml_diff>